<commit_message>
added CNN with temp =1.2 output
</commit_message>
<xml_diff>
--- a/Convectional Neural Networks Final Presentation.pptx
+++ b/Convectional Neural Networks Final Presentation.pptx
@@ -639,7 +639,7 @@
           </a:ln>
           <a:extLst>
             <a:ext uri="{909E8E84-426E-40dd-AFC4-6F175D3DCCD1}">
-              <a14:hiddenFill xmlns="" xmlns:a14="http://schemas.microsoft.com/office/drawing/2010/main">
+              <a14:hiddenFill xmlns:a14="http://schemas.microsoft.com/office/drawing/2010/main" xmlns="">
                 <a:solidFill>
                   <a:srgbClr val="FFFFFF"/>
                 </a:solidFill>
@@ -1091,14 +1091,14 @@
           </a:ln>
           <a:extLst>
             <a:ext uri="{909E8E84-426E-40dd-AFC4-6F175D3DCCD1}">
-              <a14:hiddenFill xmlns:a14="http://schemas.microsoft.com/office/drawing/2010/main" xmlns="">
+              <a14:hiddenFill xmlns="" xmlns:a14="http://schemas.microsoft.com/office/drawing/2010/main">
                 <a:solidFill>
                   <a:srgbClr val="FFFFFF"/>
                 </a:solidFill>
               </a14:hiddenFill>
             </a:ext>
             <a:ext uri="{91240B29-F687-4f45-9708-019B960494DF}">
-              <a14:hiddenLine xmlns:a14="http://schemas.microsoft.com/office/drawing/2010/main" xmlns="" w="9525">
+              <a14:hiddenLine xmlns="" xmlns:a14="http://schemas.microsoft.com/office/drawing/2010/main" w="9525">
                 <a:solidFill>
                   <a:srgbClr val="000000"/>
                 </a:solidFill>
@@ -1132,14 +1132,14 @@
           </a:ln>
           <a:extLst>
             <a:ext uri="{909E8E84-426E-40dd-AFC4-6F175D3DCCD1}">
-              <a14:hiddenFill xmlns:a14="http://schemas.microsoft.com/office/drawing/2010/main" xmlns="">
+              <a14:hiddenFill xmlns="" xmlns:a14="http://schemas.microsoft.com/office/drawing/2010/main">
                 <a:solidFill>
                   <a:srgbClr val="FFFFFF"/>
                 </a:solidFill>
               </a14:hiddenFill>
             </a:ext>
             <a:ext uri="{91240B29-F687-4f45-9708-019B960494DF}">
-              <a14:hiddenLine xmlns:a14="http://schemas.microsoft.com/office/drawing/2010/main" xmlns="" w="9525">
+              <a14:hiddenLine xmlns="" xmlns:a14="http://schemas.microsoft.com/office/drawing/2010/main" w="9525">
                 <a:solidFill>
                   <a:srgbClr val="000000"/>
                 </a:solidFill>
@@ -1288,7 +1288,7 @@
           </a:ln>
           <a:extLst>
             <a:ext uri="{909E8E84-426E-40dd-AFC4-6F175D3DCCD1}">
-              <a14:hiddenFill xmlns:a14="http://schemas.microsoft.com/office/drawing/2010/main" xmlns="">
+              <a14:hiddenFill xmlns="" xmlns:a14="http://schemas.microsoft.com/office/drawing/2010/main">
                 <a:noFill/>
               </a14:hiddenFill>
             </a:ext>
@@ -1329,7 +1329,7 @@
           </a:ln>
           <a:extLst>
             <a:ext uri="{909E8E84-426E-40dd-AFC4-6F175D3DCCD1}">
-              <a14:hiddenFill xmlns:a14="http://schemas.microsoft.com/office/drawing/2010/main" xmlns="">
+              <a14:hiddenFill xmlns="" xmlns:a14="http://schemas.microsoft.com/office/drawing/2010/main">
                 <a:noFill/>
               </a14:hiddenFill>
             </a:ext>
@@ -1370,7 +1370,7 @@
           </a:ln>
           <a:extLst>
             <a:ext uri="{909E8E84-426E-40dd-AFC4-6F175D3DCCD1}">
-              <a14:hiddenFill xmlns:a14="http://schemas.microsoft.com/office/drawing/2010/main" xmlns="">
+              <a14:hiddenFill xmlns="" xmlns:a14="http://schemas.microsoft.com/office/drawing/2010/main">
                 <a:solidFill>
                   <a:srgbClr val="FFFFFF"/>
                 </a:solidFill>
@@ -1513,7 +1513,7 @@
           </a:ln>
           <a:extLst>
             <a:ext uri="{909E8E84-426E-40dd-AFC4-6F175D3DCCD1}">
-              <a14:hiddenFill xmlns:a14="http://schemas.microsoft.com/office/drawing/2010/main" xmlns="">
+              <a14:hiddenFill xmlns="" xmlns:a14="http://schemas.microsoft.com/office/drawing/2010/main">
                 <a:solidFill>
                   <a:srgbClr val="FFFFFF"/>
                 </a:solidFill>
@@ -3414,14 +3414,14 @@
           </a:ln>
           <a:extLst>
             <a:ext uri="{909E8E84-426E-40dd-AFC4-6F175D3DCCD1}">
-              <a14:hiddenFill xmlns:a14="http://schemas.microsoft.com/office/drawing/2010/main" xmlns="">
+              <a14:hiddenFill xmlns="" xmlns:a14="http://schemas.microsoft.com/office/drawing/2010/main">
                 <a:solidFill>
                   <a:srgbClr val="FFFFFF"/>
                 </a:solidFill>
               </a14:hiddenFill>
             </a:ext>
             <a:ext uri="{91240B29-F687-4f45-9708-019B960494DF}">
-              <a14:hiddenLine xmlns:a14="http://schemas.microsoft.com/office/drawing/2010/main" xmlns="" w="9525">
+              <a14:hiddenLine xmlns="" xmlns:a14="http://schemas.microsoft.com/office/drawing/2010/main" w="9525">
                 <a:solidFill>
                   <a:srgbClr val="000000"/>
                 </a:solidFill>
@@ -3457,14 +3457,14 @@
           </a:ln>
           <a:extLst>
             <a:ext uri="{909E8E84-426E-40dd-AFC4-6F175D3DCCD1}">
-              <a14:hiddenFill xmlns:a14="http://schemas.microsoft.com/office/drawing/2010/main" xmlns="">
+              <a14:hiddenFill xmlns="" xmlns:a14="http://schemas.microsoft.com/office/drawing/2010/main">
                 <a:solidFill>
                   <a:srgbClr val="FFFFFF"/>
                 </a:solidFill>
               </a14:hiddenFill>
             </a:ext>
             <a:ext uri="{91240B29-F687-4f45-9708-019B960494DF}">
-              <a14:hiddenLine xmlns:a14="http://schemas.microsoft.com/office/drawing/2010/main" xmlns="" w="9525">
+              <a14:hiddenLine xmlns="" xmlns:a14="http://schemas.microsoft.com/office/drawing/2010/main" w="9525">
                 <a:solidFill>
                   <a:srgbClr val="000000"/>
                 </a:solidFill>
@@ -3515,14 +3515,14 @@
           </a:ln>
           <a:extLst>
             <a:ext uri="{909E8E84-426E-40dd-AFC4-6F175D3DCCD1}">
-              <a14:hiddenFill xmlns:a14="http://schemas.microsoft.com/office/drawing/2010/main" xmlns="">
+              <a14:hiddenFill xmlns="" xmlns:a14="http://schemas.microsoft.com/office/drawing/2010/main">
                 <a:solidFill>
                   <a:srgbClr val="FFFFFF"/>
                 </a:solidFill>
               </a14:hiddenFill>
             </a:ext>
             <a:ext uri="{91240B29-F687-4f45-9708-019B960494DF}">
-              <a14:hiddenLine xmlns:a14="http://schemas.microsoft.com/office/drawing/2010/main" xmlns="" w="9525">
+              <a14:hiddenLine xmlns="" xmlns:a14="http://schemas.microsoft.com/office/drawing/2010/main" w="9525">
                 <a:solidFill>
                   <a:srgbClr val="000000"/>
                 </a:solidFill>
@@ -3576,7 +3576,7 @@
           </a:ln>
           <a:extLst>
             <a:ext uri="{909E8E84-426E-40dd-AFC4-6F175D3DCCD1}">
-              <a14:hiddenFill xmlns:a14="http://schemas.microsoft.com/office/drawing/2010/main" xmlns="">
+              <a14:hiddenFill xmlns="" xmlns:a14="http://schemas.microsoft.com/office/drawing/2010/main">
                 <a:noFill/>
               </a14:hiddenFill>
             </a:ext>
@@ -3617,7 +3617,7 @@
           <a:effectLst/>
           <a:extLst>
             <a:ext uri="{AF507438-7753-43e0-B8FC-AC1667EBCBE1}">
-              <a14:hiddenEffects xmlns:a14="http://schemas.microsoft.com/office/drawing/2010/main" xmlns="">
+              <a14:hiddenEffects xmlns="" xmlns:a14="http://schemas.microsoft.com/office/drawing/2010/main">
                 <a:effectLst>
                   <a:outerShdw dist="35921" dir="2700000" algn="ctr" rotWithShape="0">
                     <a:schemeClr val="bg2"/>
@@ -4173,14 +4173,14 @@
           </a:ln>
           <a:extLst>
             <a:ext uri="{909E8E84-426E-40dd-AFC4-6F175D3DCCD1}">
-              <a14:hiddenFill xmlns="" xmlns:a14="http://schemas.microsoft.com/office/drawing/2010/main">
+              <a14:hiddenFill xmlns:a14="http://schemas.microsoft.com/office/drawing/2010/main" xmlns="">
                 <a:solidFill>
                   <a:srgbClr val="FFFFFF"/>
                 </a:solidFill>
               </a14:hiddenFill>
             </a:ext>
             <a:ext uri="{91240B29-F687-4f45-9708-019B960494DF}">
-              <a14:hiddenLine xmlns="" xmlns:a14="http://schemas.microsoft.com/office/drawing/2010/main" w="9525">
+              <a14:hiddenLine xmlns:a14="http://schemas.microsoft.com/office/drawing/2010/main" xmlns="" w="9525">
                 <a:solidFill>
                   <a:srgbClr val="000000"/>
                 </a:solidFill>
@@ -4651,7 +4651,7 @@
               <a:buClrTx/>
             </a:pPr>
             <a:r>
-              <a:rPr lang="en-US" sz="1800" dirty="0" smtClean="0">
+              <a:rPr lang="en-US" sz="1800" b="1" dirty="0" smtClean="0">
                 <a:solidFill>
                   <a:schemeClr val="tx1"/>
                 </a:solidFill>
@@ -4659,16 +4659,32 @@
               <a:t>Character-level: </a:t>
             </a:r>
             <a:r>
-              <a:rPr lang="en-US" sz="1800" dirty="0" smtClean="0">
-                <a:solidFill>
-                  <a:srgbClr val="FF0000"/>
+              <a:rPr lang="en-US" sz="1800" dirty="0">
+                <a:solidFill>
+                  <a:schemeClr val="tx1"/>
                 </a:solidFill>
               </a:rPr>
-              <a:t>INSERT RECIPE FROM POSTER HERE</a:t>
+              <a:t>1/2 tsp. baking soda,1 tsp. vanilla extract,1 cup all purpose flour,1 teaspoon baking soda,1 teaspoon salt,6 tablespoons brown sugar,2 cups candy covered plus  1/4 finely diced,1/2 cup firmly packed brown sugar,1 egg  1 3/4 cups sugar,2 la 1/2 tsp. baking soda,1 tsp. vanilla extract  2 cups chocolate chips,1/2 cup agave nectar,1 teaspoon coconut extract ,1 teaspoon salt,1 cup </a:t>
+            </a:r>
+            <a:r>
+              <a:rPr lang="en-US" sz="1800" dirty="0" err="1">
+                <a:solidFill>
+                  <a:schemeClr val="tx1"/>
+                </a:solidFill>
+              </a:rPr>
+              <a:t>nutella</a:t>
+            </a:r>
+            <a:r>
+              <a:rPr lang="en-US" sz="1800" dirty="0">
+                <a:solidFill>
+                  <a:schemeClr val="tx1"/>
+                </a:solidFill>
+              </a:rPr>
+              <a:t>, 1/2 cup rainbow sprinkles of chopped nuts,1/3 cup chocolate hot cocoa powder,1 tsp vanilla </a:t>
             </a:r>
             <a:endParaRPr lang="en-US" sz="1800" dirty="0" smtClean="0">
               <a:solidFill>
-                <a:srgbClr val="FF0000"/>
+                <a:schemeClr val="tx1"/>
               </a:solidFill>
             </a:endParaRPr>
           </a:p>
@@ -4677,12 +4693,20 @@
               <a:buClrTx/>
             </a:pPr>
             <a:r>
+              <a:rPr lang="en-US" sz="1800" b="1" dirty="0" smtClean="0">
+                <a:solidFill>
+                  <a:schemeClr val="tx1"/>
+                </a:solidFill>
+              </a:rPr>
+              <a:t>Word-level</a:t>
+            </a:r>
+            <a:r>
               <a:rPr lang="en-US" sz="1800" dirty="0" smtClean="0">
                 <a:solidFill>
                   <a:schemeClr val="tx1"/>
                 </a:solidFill>
               </a:rPr>
-              <a:t>Word-level: </a:t>
+              <a:t>: </a:t>
             </a:r>
             <a:r>
               <a:rPr lang="en-US" sz="1800" dirty="0">
@@ -4711,7 +4735,7 @@
               <a:buClrTx/>
             </a:pPr>
             <a:r>
-              <a:rPr lang="en-US" sz="1800" dirty="0" smtClean="0">
+              <a:rPr lang="en-US" sz="1800" b="1" dirty="0" smtClean="0">
                 <a:solidFill>
                   <a:schemeClr val="tx1"/>
                 </a:solidFill>
@@ -4719,12 +4743,20 @@
               <a:t>Phrase-level</a:t>
             </a:r>
             <a:r>
+              <a:rPr lang="en-US" sz="1800" b="1" dirty="0">
+                <a:solidFill>
+                  <a:schemeClr val="tx1"/>
+                </a:solidFill>
+              </a:rPr>
+              <a:t>:</a:t>
+            </a:r>
+            <a:r>
               <a:rPr lang="en-US" sz="1800" dirty="0">
                 <a:solidFill>
                   <a:schemeClr val="tx1"/>
                 </a:solidFill>
               </a:rPr>
-              <a:t>:  1/2 cup soy or coconut vanilla flavored creamer  2 teaspoons of vanilla extract 2 teaspoons vanilla essence   1 flax egg  2 tablespoons egg or whey chocolate protein powder  2 large egg yolks at room temperature 1/3 cup dark chocolate chips 1 cup semi sweet chocolate chips  3/4 cups granulated </a:t>
+              <a:t>  1/2 cup soy or coconut vanilla flavored creamer  2 teaspoons of vanilla extract 2 teaspoons vanilla essence   1 flax egg  2 tablespoons egg or whey chocolate protein powder  2 large egg yolks at room temperature 1/3 cup dark chocolate chips 1 cup semi sweet chocolate chips  3/4 cups granulated </a:t>
             </a:r>
             <a:r>
               <a:rPr lang="en-US" sz="1800" dirty="0" smtClean="0">
@@ -4790,13 +4822,8 @@
           <a:p>
             <a:r>
               <a:rPr lang="en-US" dirty="0"/>
-              <a:t>Results </a:t>
-            </a:r>
-            <a:r>
-              <a:rPr lang="en-US" dirty="0"/>
-              <a:t>4</a:t>
-            </a:r>
-            <a:endParaRPr lang="en-US" dirty="0"/>
+              <a:t>Results 4</a:t>
+            </a:r>
           </a:p>
         </p:txBody>
       </p:sp>
@@ -4841,7 +4868,6 @@
               <a:rPr lang="en-US" sz="1800" dirty="0" smtClean="0"/>
               <a:t>overfitting</a:t>
             </a:r>
-            <a:endParaRPr lang="en-US" sz="1800" dirty="0" smtClean="0"/>
           </a:p>
           <a:p>
             <a:pPr lvl="1"/>
@@ -5410,11 +5436,7 @@
           <a:p>
             <a:r>
               <a:rPr lang="en-US" dirty="0" smtClean="0"/>
-              <a:t>Convectional Neural </a:t>
-            </a:r>
-            <a:r>
-              <a:rPr lang="en-US" dirty="0" smtClean="0"/>
-              <a:t>Networks</a:t>
+              <a:t>Convectional Neural Networks</a:t>
             </a:r>
             <a:endParaRPr lang="en-US" dirty="0"/>
           </a:p>
@@ -5437,11 +5459,7 @@
           <a:p>
             <a:r>
               <a:rPr lang="en-US" dirty="0" smtClean="0"/>
-              <a:t>Convectional Neural </a:t>
-            </a:r>
-            <a:r>
-              <a:rPr lang="en-US" dirty="0" smtClean="0"/>
-              <a:t>Networks</a:t>
+              <a:t>Convectional Neural Networks</a:t>
             </a:r>
             <a:endParaRPr lang="en-US" dirty="0"/>
           </a:p>
@@ -5855,11 +5873,7 @@
             </a:r>
             <a:r>
               <a:rPr lang="en-US" sz="1800" dirty="0" smtClean="0"/>
-              <a:t> on</a:t>
-            </a:r>
-            <a:r>
-              <a:rPr lang="en-US" sz="1800" dirty="0" smtClean="0"/>
-              <a:t> </a:t>
+              <a:t> on </a:t>
             </a:r>
             <a:r>
               <a:rPr lang="en-US" sz="1800" dirty="0"/>
@@ -5869,7 +5883,6 @@
               <a:rPr lang="en-US" sz="1800" dirty="0" smtClean="0"/>
               <a:t>’</a:t>
             </a:r>
-            <a:endParaRPr lang="en-US" sz="1800" dirty="0" smtClean="0"/>
           </a:p>
           <a:p>
             <a:r>
@@ -6183,11 +6196,7 @@
             </a:pPr>
             <a:r>
               <a:rPr lang="en-US" sz="1700" dirty="0" smtClean="0"/>
-              <a:t>Use </a:t>
-            </a:r>
-            <a:r>
-              <a:rPr lang="en-US" sz="1700" dirty="0" smtClean="0"/>
-              <a:t>phrase2vec with different </a:t>
+              <a:t>Use phrase2vec with different </a:t>
             </a:r>
             <a:r>
               <a:rPr lang="en-US" sz="1700" dirty="0" err="1" smtClean="0"/>
@@ -6195,23 +6204,7 @@
             </a:r>
             <a:r>
               <a:rPr lang="en-US" sz="1700" dirty="0" smtClean="0"/>
-              <a:t>: character-level</a:t>
-            </a:r>
-            <a:r>
-              <a:rPr lang="en-US" sz="1700" dirty="0" smtClean="0"/>
-              <a:t>, </a:t>
-            </a:r>
-            <a:r>
-              <a:rPr lang="en-US" sz="1700" dirty="0" smtClean="0"/>
-              <a:t>word-level</a:t>
-            </a:r>
-            <a:r>
-              <a:rPr lang="en-US" sz="1700" dirty="0" smtClean="0"/>
-              <a:t>, </a:t>
-            </a:r>
-            <a:r>
-              <a:rPr lang="en-US" sz="1700" dirty="0" smtClean="0"/>
-              <a:t>phrase-level</a:t>
+              <a:t>: character-level, word-level, phrase-level</a:t>
             </a:r>
             <a:endParaRPr lang="en-US" sz="1700" dirty="0"/>
           </a:p>
@@ -6246,7 +6239,6 @@
               <a:rPr lang="en-US" sz="1700" dirty="0" smtClean="0"/>
               <a:t>50</a:t>
             </a:r>
-            <a:endParaRPr lang="en-US" sz="1700" dirty="0" smtClean="0"/>
           </a:p>
           <a:p>
             <a:r>
@@ -6303,11 +6295,7 @@
             </a:pPr>
             <a:r>
               <a:rPr lang="en-US" sz="2000" dirty="0" smtClean="0"/>
-              <a:t>Step 4: Hyper-parameter </a:t>
-            </a:r>
-            <a:r>
-              <a:rPr lang="en-US" sz="2000" dirty="0" smtClean="0"/>
-              <a:t>Tuning </a:t>
+              <a:t>Step 4: Hyper-parameter Tuning </a:t>
             </a:r>
           </a:p>
           <a:p>
@@ -6334,11 +6322,7 @@
             </a:r>
             <a:r>
               <a:rPr lang="en-US" sz="1600" dirty="0" smtClean="0"/>
-              <a:t>onsidered bi-directional </a:t>
-            </a:r>
-            <a:r>
-              <a:rPr lang="en-US" sz="1600" dirty="0" smtClean="0"/>
-              <a:t>LSTM</a:t>
+              <a:t>onsidered bi-directional LSTM</a:t>
             </a:r>
           </a:p>
           <a:p>
@@ -6781,15 +6765,7 @@
                   <a:schemeClr val="tx1"/>
                 </a:solidFill>
               </a:rPr>
-              <a:t>Convolutional </a:t>
-            </a:r>
-            <a:r>
-              <a:rPr lang="en-US" sz="2000" u="sng" dirty="0" smtClean="0">
-                <a:solidFill>
-                  <a:schemeClr val="tx1"/>
-                </a:solidFill>
-              </a:rPr>
-              <a:t>NNs:</a:t>
+              <a:t>Convolutional NNs:</a:t>
             </a:r>
             <a:r>
               <a:rPr lang="en-US" sz="2000" dirty="0" smtClean="0">
@@ -7182,11 +7158,7 @@
             </a:pPr>
             <a:r>
               <a:rPr lang="en-US" kern="0" dirty="0" smtClean="0"/>
-              <a:t>Character </a:t>
-            </a:r>
-            <a:r>
-              <a:rPr lang="en-US" kern="0" dirty="0" smtClean="0"/>
-              <a:t>level embedding with CNN</a:t>
+              <a:t>Character level embedding with CNN</a:t>
             </a:r>
           </a:p>
           <a:p>
@@ -7278,14 +7250,14 @@
           </a:ln>
           <a:extLst>
             <a:ext uri="{909E8E84-426E-40dd-AFC4-6F175D3DCCD1}">
-              <a14:hiddenFill xmlns:a14="http://schemas.microsoft.com/office/drawing/2010/main" xmlns="">
+              <a14:hiddenFill xmlns="" xmlns:a14="http://schemas.microsoft.com/office/drawing/2010/main">
                 <a:solidFill>
                   <a:srgbClr val="FFFFFF"/>
                 </a:solidFill>
               </a14:hiddenFill>
             </a:ext>
             <a:ext uri="{91240B29-F687-4f45-9708-019B960494DF}">
-              <a14:hiddenLine xmlns:a14="http://schemas.microsoft.com/office/drawing/2010/main" xmlns="" w="9525">
+              <a14:hiddenLine xmlns="" xmlns:a14="http://schemas.microsoft.com/office/drawing/2010/main" w="9525">
                 <a:solidFill>
                   <a:srgbClr val="000000"/>
                 </a:solidFill>
@@ -7784,14 +7756,14 @@
           </a:ln>
           <a:extLst>
             <a:ext uri="{909E8E84-426E-40dd-AFC4-6F175D3DCCD1}">
-              <a14:hiddenFill xmlns:a14="http://schemas.microsoft.com/office/drawing/2010/main" xmlns="">
+              <a14:hiddenFill xmlns="" xmlns:a14="http://schemas.microsoft.com/office/drawing/2010/main">
                 <a:solidFill>
                   <a:srgbClr val="FFFFFF"/>
                 </a:solidFill>
               </a14:hiddenFill>
             </a:ext>
             <a:ext uri="{91240B29-F687-4f45-9708-019B960494DF}">
-              <a14:hiddenLine xmlns:a14="http://schemas.microsoft.com/office/drawing/2010/main" xmlns="" w="9525">
+              <a14:hiddenLine xmlns="" xmlns:a14="http://schemas.microsoft.com/office/drawing/2010/main" w="9525">
                 <a:solidFill>
                   <a:srgbClr val="000000"/>
                 </a:solidFill>
@@ -8110,7 +8082,7 @@
         <a:effectLst/>
         <a:extLst>
           <a:ext uri="{AF507438-7753-43e0-B8FC-AC1667EBCBE1}">
-            <a14:hiddenEffects xmlns:a14="http://schemas.microsoft.com/office/drawing/2010/main" xmlns="">
+            <a14:hiddenEffects xmlns="" xmlns:a14="http://schemas.microsoft.com/office/drawing/2010/main">
               <a:effectLst>
                 <a:outerShdw dist="35921" dir="2700000" algn="ctr" rotWithShape="0">
                   <a:schemeClr val="bg2"/>
@@ -8183,7 +8155,7 @@
         <a:effectLst/>
         <a:extLst>
           <a:ext uri="{AF507438-7753-43e0-B8FC-AC1667EBCBE1}">
-            <a14:hiddenEffects xmlns:a14="http://schemas.microsoft.com/office/drawing/2010/main" xmlns="">
+            <a14:hiddenEffects xmlns="" xmlns:a14="http://schemas.microsoft.com/office/drawing/2010/main">
               <a:effectLst>
                 <a:outerShdw dist="35921" dir="2700000" algn="ctr" rotWithShape="0">
                   <a:schemeClr val="bg2"/>

</xml_diff>

<commit_message>
edited problem statement and data set slides
</commit_message>
<xml_diff>
--- a/Convectional Neural Networks Final Presentation.pptx
+++ b/Convectional Neural Networks Final Presentation.pptx
@@ -641,7 +641,7 @@
           </a:ln>
           <a:extLst>
             <a:ext uri="{909E8E84-426E-40dd-AFC4-6F175D3DCCD1}">
-              <a14:hiddenFill xmlns="" xmlns:a14="http://schemas.microsoft.com/office/drawing/2010/main">
+              <a14:hiddenFill xmlns:a14="http://schemas.microsoft.com/office/drawing/2010/main" xmlns="">
                 <a:solidFill>
                   <a:srgbClr val="FFFFFF"/>
                 </a:solidFill>
@@ -1093,14 +1093,14 @@
           </a:ln>
           <a:extLst>
             <a:ext uri="{909E8E84-426E-40dd-AFC4-6F175D3DCCD1}">
-              <a14:hiddenFill xmlns:a14="http://schemas.microsoft.com/office/drawing/2010/main" xmlns="">
+              <a14:hiddenFill xmlns="" xmlns:a14="http://schemas.microsoft.com/office/drawing/2010/main">
                 <a:solidFill>
                   <a:srgbClr val="FFFFFF"/>
                 </a:solidFill>
               </a14:hiddenFill>
             </a:ext>
             <a:ext uri="{91240B29-F687-4f45-9708-019B960494DF}">
-              <a14:hiddenLine xmlns:a14="http://schemas.microsoft.com/office/drawing/2010/main" xmlns="" w="9525">
+              <a14:hiddenLine xmlns="" xmlns:a14="http://schemas.microsoft.com/office/drawing/2010/main" w="9525">
                 <a:solidFill>
                   <a:srgbClr val="000000"/>
                 </a:solidFill>
@@ -1134,14 +1134,14 @@
           </a:ln>
           <a:extLst>
             <a:ext uri="{909E8E84-426E-40dd-AFC4-6F175D3DCCD1}">
-              <a14:hiddenFill xmlns:a14="http://schemas.microsoft.com/office/drawing/2010/main" xmlns="">
+              <a14:hiddenFill xmlns="" xmlns:a14="http://schemas.microsoft.com/office/drawing/2010/main">
                 <a:solidFill>
                   <a:srgbClr val="FFFFFF"/>
                 </a:solidFill>
               </a14:hiddenFill>
             </a:ext>
             <a:ext uri="{91240B29-F687-4f45-9708-019B960494DF}">
-              <a14:hiddenLine xmlns:a14="http://schemas.microsoft.com/office/drawing/2010/main" xmlns="" w="9525">
+              <a14:hiddenLine xmlns="" xmlns:a14="http://schemas.microsoft.com/office/drawing/2010/main" w="9525">
                 <a:solidFill>
                   <a:srgbClr val="000000"/>
                 </a:solidFill>
@@ -1290,7 +1290,7 @@
           </a:ln>
           <a:extLst>
             <a:ext uri="{909E8E84-426E-40dd-AFC4-6F175D3DCCD1}">
-              <a14:hiddenFill xmlns:a14="http://schemas.microsoft.com/office/drawing/2010/main" xmlns="">
+              <a14:hiddenFill xmlns="" xmlns:a14="http://schemas.microsoft.com/office/drawing/2010/main">
                 <a:noFill/>
               </a14:hiddenFill>
             </a:ext>
@@ -1331,7 +1331,7 @@
           </a:ln>
           <a:extLst>
             <a:ext uri="{909E8E84-426E-40dd-AFC4-6F175D3DCCD1}">
-              <a14:hiddenFill xmlns:a14="http://schemas.microsoft.com/office/drawing/2010/main" xmlns="">
+              <a14:hiddenFill xmlns="" xmlns:a14="http://schemas.microsoft.com/office/drawing/2010/main">
                 <a:noFill/>
               </a14:hiddenFill>
             </a:ext>
@@ -1372,7 +1372,7 @@
           </a:ln>
           <a:extLst>
             <a:ext uri="{909E8E84-426E-40dd-AFC4-6F175D3DCCD1}">
-              <a14:hiddenFill xmlns:a14="http://schemas.microsoft.com/office/drawing/2010/main" xmlns="">
+              <a14:hiddenFill xmlns="" xmlns:a14="http://schemas.microsoft.com/office/drawing/2010/main">
                 <a:solidFill>
                   <a:srgbClr val="FFFFFF"/>
                 </a:solidFill>
@@ -1515,7 +1515,7 @@
           </a:ln>
           <a:extLst>
             <a:ext uri="{909E8E84-426E-40dd-AFC4-6F175D3DCCD1}">
-              <a14:hiddenFill xmlns:a14="http://schemas.microsoft.com/office/drawing/2010/main" xmlns="">
+              <a14:hiddenFill xmlns="" xmlns:a14="http://schemas.microsoft.com/office/drawing/2010/main">
                 <a:solidFill>
                   <a:srgbClr val="FFFFFF"/>
                 </a:solidFill>
@@ -3416,14 +3416,14 @@
           </a:ln>
           <a:extLst>
             <a:ext uri="{909E8E84-426E-40dd-AFC4-6F175D3DCCD1}">
-              <a14:hiddenFill xmlns:a14="http://schemas.microsoft.com/office/drawing/2010/main" xmlns="">
+              <a14:hiddenFill xmlns="" xmlns:a14="http://schemas.microsoft.com/office/drawing/2010/main">
                 <a:solidFill>
                   <a:srgbClr val="FFFFFF"/>
                 </a:solidFill>
               </a14:hiddenFill>
             </a:ext>
             <a:ext uri="{91240B29-F687-4f45-9708-019B960494DF}">
-              <a14:hiddenLine xmlns:a14="http://schemas.microsoft.com/office/drawing/2010/main" xmlns="" w="9525">
+              <a14:hiddenLine xmlns="" xmlns:a14="http://schemas.microsoft.com/office/drawing/2010/main" w="9525">
                 <a:solidFill>
                   <a:srgbClr val="000000"/>
                 </a:solidFill>
@@ -3459,14 +3459,14 @@
           </a:ln>
           <a:extLst>
             <a:ext uri="{909E8E84-426E-40dd-AFC4-6F175D3DCCD1}">
-              <a14:hiddenFill xmlns:a14="http://schemas.microsoft.com/office/drawing/2010/main" xmlns="">
+              <a14:hiddenFill xmlns="" xmlns:a14="http://schemas.microsoft.com/office/drawing/2010/main">
                 <a:solidFill>
                   <a:srgbClr val="FFFFFF"/>
                 </a:solidFill>
               </a14:hiddenFill>
             </a:ext>
             <a:ext uri="{91240B29-F687-4f45-9708-019B960494DF}">
-              <a14:hiddenLine xmlns:a14="http://schemas.microsoft.com/office/drawing/2010/main" xmlns="" w="9525">
+              <a14:hiddenLine xmlns="" xmlns:a14="http://schemas.microsoft.com/office/drawing/2010/main" w="9525">
                 <a:solidFill>
                   <a:srgbClr val="000000"/>
                 </a:solidFill>
@@ -3517,14 +3517,14 @@
           </a:ln>
           <a:extLst>
             <a:ext uri="{909E8E84-426E-40dd-AFC4-6F175D3DCCD1}">
-              <a14:hiddenFill xmlns:a14="http://schemas.microsoft.com/office/drawing/2010/main" xmlns="">
+              <a14:hiddenFill xmlns="" xmlns:a14="http://schemas.microsoft.com/office/drawing/2010/main">
                 <a:solidFill>
                   <a:srgbClr val="FFFFFF"/>
                 </a:solidFill>
               </a14:hiddenFill>
             </a:ext>
             <a:ext uri="{91240B29-F687-4f45-9708-019B960494DF}">
-              <a14:hiddenLine xmlns:a14="http://schemas.microsoft.com/office/drawing/2010/main" xmlns="" w="9525">
+              <a14:hiddenLine xmlns="" xmlns:a14="http://schemas.microsoft.com/office/drawing/2010/main" w="9525">
                 <a:solidFill>
                   <a:srgbClr val="000000"/>
                 </a:solidFill>
@@ -3578,7 +3578,7 @@
           </a:ln>
           <a:extLst>
             <a:ext uri="{909E8E84-426E-40dd-AFC4-6F175D3DCCD1}">
-              <a14:hiddenFill xmlns:a14="http://schemas.microsoft.com/office/drawing/2010/main" xmlns="">
+              <a14:hiddenFill xmlns="" xmlns:a14="http://schemas.microsoft.com/office/drawing/2010/main">
                 <a:noFill/>
               </a14:hiddenFill>
             </a:ext>
@@ -3619,7 +3619,7 @@
           <a:effectLst/>
           <a:extLst>
             <a:ext uri="{AF507438-7753-43e0-B8FC-AC1667EBCBE1}">
-              <a14:hiddenEffects xmlns:a14="http://schemas.microsoft.com/office/drawing/2010/main" xmlns="">
+              <a14:hiddenEffects xmlns="" xmlns:a14="http://schemas.microsoft.com/office/drawing/2010/main">
                 <a:effectLst>
                   <a:outerShdw dist="35921" dir="2700000" algn="ctr" rotWithShape="0">
                     <a:schemeClr val="bg2"/>
@@ -4175,14 +4175,14 @@
           </a:ln>
           <a:extLst>
             <a:ext uri="{909E8E84-426E-40dd-AFC4-6F175D3DCCD1}">
-              <a14:hiddenFill xmlns="" xmlns:a14="http://schemas.microsoft.com/office/drawing/2010/main">
+              <a14:hiddenFill xmlns:a14="http://schemas.microsoft.com/office/drawing/2010/main" xmlns="">
                 <a:solidFill>
                   <a:srgbClr val="FFFFFF"/>
                 </a:solidFill>
               </a14:hiddenFill>
             </a:ext>
             <a:ext uri="{91240B29-F687-4f45-9708-019B960494DF}">
-              <a14:hiddenLine xmlns="" xmlns:a14="http://schemas.microsoft.com/office/drawing/2010/main" w="9525">
+              <a14:hiddenLine xmlns:a14="http://schemas.microsoft.com/office/drawing/2010/main" xmlns="" w="9525">
                 <a:solidFill>
                   <a:srgbClr val="000000"/>
                 </a:solidFill>
@@ -4812,14 +4812,14 @@
           </a:ln>
           <a:extLst>
             <a:ext uri="{909E8E84-426E-40dd-AFC4-6F175D3DCCD1}">
-              <a14:hiddenFill xmlns:a14="http://schemas.microsoft.com/office/drawing/2010/main" xmlns="">
+              <a14:hiddenFill xmlns="" xmlns:a14="http://schemas.microsoft.com/office/drawing/2010/main">
                 <a:solidFill>
                   <a:srgbClr val="FFFFFF"/>
                 </a:solidFill>
               </a14:hiddenFill>
             </a:ext>
             <a:ext uri="{91240B29-F687-4f45-9708-019B960494DF}">
-              <a14:hiddenLine xmlns:a14="http://schemas.microsoft.com/office/drawing/2010/main" xmlns="" w="9525">
+              <a14:hiddenLine xmlns="" xmlns:a14="http://schemas.microsoft.com/office/drawing/2010/main" w="9525">
                 <a:solidFill>
                   <a:srgbClr val="000000"/>
                 </a:solidFill>
@@ -6215,6 +6215,9 @@
               <a:rPr lang="en-US" sz="1600" dirty="0" smtClean="0"/>
               <a:t>with</a:t>
             </a:r>
+            <a:br>
+              <a:rPr lang="en-US" sz="1600" dirty="0" smtClean="0"/>
+            </a:br>
             <a:endParaRPr lang="en-US" sz="1600" dirty="0"/>
           </a:p>
           <a:p>
@@ -6267,6 +6270,9 @@
               <a:rPr lang="en-US" sz="1600" b="1" dirty="0" smtClean="0"/>
               <a:t>problematic</a:t>
             </a:r>
+            <a:br>
+              <a:rPr lang="en-US" sz="1600" b="1" dirty="0" smtClean="0"/>
+            </a:br>
             <a:endParaRPr lang="en-US" sz="1600" dirty="0" smtClean="0"/>
           </a:p>
           <a:p>
@@ -6293,11 +6299,7 @@
             </a:r>
             <a:r>
               <a:rPr lang="en-US" sz="1600" dirty="0"/>
-              <a:t>have been trained on a very general set of recipes including multiple types of food (both savory and sweet recipes</a:t>
-            </a:r>
-            <a:r>
-              <a:rPr lang="en-US" sz="1600" dirty="0" smtClean="0"/>
-              <a:t>)</a:t>
+              <a:t>have been trained on a very general set of recipes including multiple types of food </a:t>
             </a:r>
             <a:endParaRPr lang="en-US" sz="1600" dirty="0"/>
           </a:p>
@@ -6308,8 +6310,12 @@
               <a:buChar char="•"/>
             </a:pPr>
             <a:r>
+              <a:rPr lang="en-US" sz="1600" dirty="0" smtClean="0"/>
+              <a:t>Some </a:t>
+            </a:r>
+            <a:r>
               <a:rPr lang="en-US" sz="1600" dirty="0"/>
-              <a:t>Some common ingredient like salt appears in recipes as varied as cakes, burgers and pizzas, confusing the </a:t>
+              <a:t>common ingredient like salt appears in recipes as varied as cakes, burgers and pizzas, confusing the </a:t>
             </a:r>
             <a:r>
               <a:rPr lang="en-US" sz="1600" dirty="0" smtClean="0"/>
@@ -6502,6 +6508,9 @@
               <a:rPr lang="en-US" sz="1400" dirty="0" smtClean="0"/>
               <a:t>']</a:t>
             </a:r>
+            <a:br>
+              <a:rPr lang="en-US" sz="1400" dirty="0" smtClean="0"/>
+            </a:br>
             <a:endParaRPr lang="en-US" sz="1800" dirty="0" smtClean="0"/>
           </a:p>
           <a:p>
@@ -6525,7 +6534,7 @@
             </a:pPr>
             <a:r>
               <a:rPr lang="en-US" sz="1400" dirty="0"/>
-              <a:t>Removed special characters and converted from Unicode to ASCII</a:t>
+              <a:t>Removed special characters </a:t>
             </a:r>
           </a:p>
           <a:p>
@@ -6534,26 +6543,24 @@
             </a:pPr>
             <a:r>
               <a:rPr lang="en-US" sz="1400" dirty="0"/>
-              <a:t>Created a dictionary of words by looking at the term frequency matrix of the corpus and removing any infrequent (&lt;100) terms</a:t>
-            </a:r>
-          </a:p>
-          <a:p>
-            <a:pPr lvl="1">
-              <a:buClrTx/>
-            </a:pPr>
-            <a:r>
-              <a:rPr lang="en-US" sz="1400" dirty="0"/>
-              <a:t>Inspected the final dictionary and removed any words that were instructions or were unrelated to cookies</a:t>
-            </a:r>
-          </a:p>
-          <a:p>
-            <a:pPr lvl="1">
-              <a:buClrTx/>
-            </a:pPr>
-            <a:r>
-              <a:rPr lang="en-US" sz="1400" dirty="0"/>
-              <a:t>Removed any words not in the final dictionary from the corpus</a:t>
-            </a:r>
+              <a:t>Inspected the final dictionary and removed any words that were instructions or were unrelated </a:t>
+            </a:r>
+            <a:r>
+              <a:rPr lang="en-US" sz="1400"/>
+              <a:t>to </a:t>
+            </a:r>
+            <a:r>
+              <a:rPr lang="en-US" sz="1400" smtClean="0"/>
+              <a:t>cookies</a:t>
+            </a:r>
+            <a:r>
+              <a:rPr lang="en-US" sz="1400" dirty="0" smtClean="0"/>
+              <a:t/>
+            </a:r>
+            <a:br>
+              <a:rPr lang="en-US" sz="1400" dirty="0" smtClean="0"/>
+            </a:br>
+            <a:endParaRPr lang="en-US" sz="1400" dirty="0"/>
           </a:p>
           <a:p>
             <a:r>
@@ -7808,14 +7815,14 @@
           </a:ln>
           <a:extLst>
             <a:ext uri="{909E8E84-426E-40dd-AFC4-6F175D3DCCD1}">
-              <a14:hiddenFill xmlns:a14="http://schemas.microsoft.com/office/drawing/2010/main" xmlns="">
+              <a14:hiddenFill xmlns="" xmlns:a14="http://schemas.microsoft.com/office/drawing/2010/main">
                 <a:solidFill>
                   <a:srgbClr val="FFFFFF"/>
                 </a:solidFill>
               </a14:hiddenFill>
             </a:ext>
             <a:ext uri="{91240B29-F687-4f45-9708-019B960494DF}">
-              <a14:hiddenLine xmlns:a14="http://schemas.microsoft.com/office/drawing/2010/main" xmlns="" w="9525">
+              <a14:hiddenLine xmlns="" xmlns:a14="http://schemas.microsoft.com/office/drawing/2010/main" w="9525">
                 <a:solidFill>
                   <a:srgbClr val="000000"/>
                 </a:solidFill>
@@ -8204,7 +8211,7 @@
         <a:effectLst/>
         <a:extLst>
           <a:ext uri="{AF507438-7753-43e0-B8FC-AC1667EBCBE1}">
-            <a14:hiddenEffects xmlns:a14="http://schemas.microsoft.com/office/drawing/2010/main" xmlns="">
+            <a14:hiddenEffects xmlns="" xmlns:a14="http://schemas.microsoft.com/office/drawing/2010/main">
               <a:effectLst>
                 <a:outerShdw dist="35921" dir="2700000" algn="ctr" rotWithShape="0">
                   <a:schemeClr val="bg2"/>
@@ -8277,7 +8284,7 @@
         <a:effectLst/>
         <a:extLst>
           <a:ext uri="{AF507438-7753-43e0-B8FC-AC1667EBCBE1}">
-            <a14:hiddenEffects xmlns:a14="http://schemas.microsoft.com/office/drawing/2010/main" xmlns="">
+            <a14:hiddenEffects xmlns="" xmlns:a14="http://schemas.microsoft.com/office/drawing/2010/main">
               <a:effectLst>
                 <a:outerShdw dist="35921" dir="2700000" algn="ctr" rotWithShape="0">
                   <a:schemeClr val="bg2"/>

</xml_diff>